<commit_message>
Trabajo del primer Sprint arquitectura 1.2
</commit_message>
<xml_diff>
--- a/Sprint 0 - Visión de Arquitectura_JesusMendoza.pptx
+++ b/Sprint 0 - Visión de Arquitectura_JesusMendoza.pptx
@@ -210,7 +210,7 @@
           <a:p>
             <a:fld id="{AC803F5C-E503-BB4A-B6E4-7BABB161709F}" type="datetimeFigureOut">
               <a:rPr lang="es-CO" smtClean="0"/>
-              <a:t>6/09/2022</a:t>
+              <a:t>7/09/2022</a:t>
             </a:fld>
             <a:endParaRPr lang="es-CO"/>
           </a:p>
@@ -801,7 +801,7 @@
           <a:p>
             <a:fld id="{E544A550-247C-D14E-BBBA-0290F981E99C}" type="datetimeFigureOut">
               <a:rPr lang="es-CO" smtClean="0"/>
-              <a:t>6/09/2022</a:t>
+              <a:t>7/09/2022</a:t>
             </a:fld>
             <a:endParaRPr lang="es-CO"/>
           </a:p>
@@ -1001,7 +1001,7 @@
           <a:p>
             <a:fld id="{E544A550-247C-D14E-BBBA-0290F981E99C}" type="datetimeFigureOut">
               <a:rPr lang="es-CO" smtClean="0"/>
-              <a:t>6/09/2022</a:t>
+              <a:t>7/09/2022</a:t>
             </a:fld>
             <a:endParaRPr lang="es-CO"/>
           </a:p>
@@ -1211,7 +1211,7 @@
           <a:p>
             <a:fld id="{E544A550-247C-D14E-BBBA-0290F981E99C}" type="datetimeFigureOut">
               <a:rPr lang="es-CO" smtClean="0"/>
-              <a:t>6/09/2022</a:t>
+              <a:t>7/09/2022</a:t>
             </a:fld>
             <a:endParaRPr lang="es-CO"/>
           </a:p>
@@ -1468,7 +1468,7 @@
           <a:p>
             <a:fld id="{E544A550-247C-D14E-BBBA-0290F981E99C}" type="datetimeFigureOut">
               <a:rPr lang="es-CO" smtClean="0"/>
-              <a:t>6/09/2022</a:t>
+              <a:t>7/09/2022</a:t>
             </a:fld>
             <a:endParaRPr lang="es-CO"/>
           </a:p>
@@ -1744,7 +1744,7 @@
           <a:p>
             <a:fld id="{E544A550-247C-D14E-BBBA-0290F981E99C}" type="datetimeFigureOut">
               <a:rPr lang="es-CO" smtClean="0"/>
-              <a:t>6/09/2022</a:t>
+              <a:t>7/09/2022</a:t>
             </a:fld>
             <a:endParaRPr lang="es-CO"/>
           </a:p>
@@ -2012,7 +2012,7 @@
           <a:p>
             <a:fld id="{E544A550-247C-D14E-BBBA-0290F981E99C}" type="datetimeFigureOut">
               <a:rPr lang="es-CO" smtClean="0"/>
-              <a:t>6/09/2022</a:t>
+              <a:t>7/09/2022</a:t>
             </a:fld>
             <a:endParaRPr lang="es-CO"/>
           </a:p>
@@ -2427,7 +2427,7 @@
           <a:p>
             <a:fld id="{E544A550-247C-D14E-BBBA-0290F981E99C}" type="datetimeFigureOut">
               <a:rPr lang="es-CO" smtClean="0"/>
-              <a:t>6/09/2022</a:t>
+              <a:t>7/09/2022</a:t>
             </a:fld>
             <a:endParaRPr lang="es-CO"/>
           </a:p>
@@ -2569,7 +2569,7 @@
           <a:p>
             <a:fld id="{E544A550-247C-D14E-BBBA-0290F981E99C}" type="datetimeFigureOut">
               <a:rPr lang="es-CO" smtClean="0"/>
-              <a:t>6/09/2022</a:t>
+              <a:t>7/09/2022</a:t>
             </a:fld>
             <a:endParaRPr lang="es-CO"/>
           </a:p>
@@ -2682,7 +2682,7 @@
           <a:p>
             <a:fld id="{E544A550-247C-D14E-BBBA-0290F981E99C}" type="datetimeFigureOut">
               <a:rPr lang="es-CO" smtClean="0"/>
-              <a:t>6/09/2022</a:t>
+              <a:t>7/09/2022</a:t>
             </a:fld>
             <a:endParaRPr lang="es-CO"/>
           </a:p>
@@ -2995,7 +2995,7 @@
           <a:p>
             <a:fld id="{E544A550-247C-D14E-BBBA-0290F981E99C}" type="datetimeFigureOut">
               <a:rPr lang="es-CO" smtClean="0"/>
-              <a:t>6/09/2022</a:t>
+              <a:t>7/09/2022</a:t>
             </a:fld>
             <a:endParaRPr lang="es-CO"/>
           </a:p>
@@ -3284,7 +3284,7 @@
           <a:p>
             <a:fld id="{E544A550-247C-D14E-BBBA-0290F981E99C}" type="datetimeFigureOut">
               <a:rPr lang="es-CO" smtClean="0"/>
-              <a:t>6/09/2022</a:t>
+              <a:t>7/09/2022</a:t>
             </a:fld>
             <a:endParaRPr lang="es-CO"/>
           </a:p>
@@ -3527,7 +3527,7 @@
           <a:p>
             <a:fld id="{E544A550-247C-D14E-BBBA-0290F981E99C}" type="datetimeFigureOut">
               <a:rPr lang="es-CO" smtClean="0"/>
-              <a:t>6/09/2022</a:t>
+              <a:t>7/09/2022</a:t>
             </a:fld>
             <a:endParaRPr lang="es-CO"/>
           </a:p>
@@ -5362,10 +5362,10 @@
       </p:pic>
       <p:pic>
         <p:nvPicPr>
-          <p:cNvPr id="9" name="Imagen 8">
+          <p:cNvPr id="8" name="Imagen 7" descr="Interfaz de usuario gráfica&#10;&#10;Descripción generada automáticamente">
             <a:extLst>
               <a:ext uri="{FF2B5EF4-FFF2-40B4-BE49-F238E27FC236}">
-                <a16:creationId xmlns:a16="http://schemas.microsoft.com/office/drawing/2014/main" id="{383C1CB3-FF22-4169-99E6-063C36C3F794}"/>
+                <a16:creationId xmlns:a16="http://schemas.microsoft.com/office/drawing/2014/main" id="{57319013-3D7D-3A9A-1832-B0A1D42AB4D8}"/>
               </a:ext>
             </a:extLst>
           </p:cNvPr>
@@ -5382,8 +5382,8 @@
         </p:blipFill>
         <p:spPr>
           <a:xfrm>
-            <a:off x="1757916" y="1812401"/>
-            <a:ext cx="7439025" cy="4391025"/>
+            <a:off x="1757916" y="1627678"/>
+            <a:ext cx="6560461" cy="4551180"/>
           </a:xfrm>
           <a:prstGeom prst="rect">
             <a:avLst/>
@@ -8444,7 +8444,7 @@
           <p:nvPr>
             <p:extLst>
               <p:ext uri="{D42A27DB-BD31-4B8C-83A1-F6EECF244321}">
-                <p14:modId xmlns:p14="http://schemas.microsoft.com/office/powerpoint/2010/main" val="801480807"/>
+                <p14:modId xmlns:p14="http://schemas.microsoft.com/office/powerpoint/2010/main" val="1137356623"/>
               </p:ext>
             </p:extLst>
           </p:nvPr>
@@ -9365,10 +9365,10 @@
       </p:graphicFrame>
       <p:pic>
         <p:nvPicPr>
-          <p:cNvPr id="6" name="Imagen 5" descr="Interfaz de usuario gráfica, Aplicación&#10;&#10;Descripción generada automáticamente">
+          <p:cNvPr id="4" name="Imagen 3" descr="Imagen de la pantalla de un celular con letras&#10;&#10;Descripción generada automáticamente con confianza media">
             <a:extLst>
               <a:ext uri="{FF2B5EF4-FFF2-40B4-BE49-F238E27FC236}">
-                <a16:creationId xmlns:a16="http://schemas.microsoft.com/office/drawing/2014/main" id="{DEF92FBF-C816-D685-656A-0F7BFE1553F8}"/>
+                <a16:creationId xmlns:a16="http://schemas.microsoft.com/office/drawing/2014/main" id="{F76683AD-BFC8-7991-E473-AFE98F8532AA}"/>
               </a:ext>
             </a:extLst>
           </p:cNvPr>
@@ -9385,8 +9385,8 @@
         </p:blipFill>
         <p:spPr>
           <a:xfrm>
-            <a:off x="2405616" y="2152789"/>
-            <a:ext cx="6581775" cy="3724275"/>
+            <a:off x="708836" y="2121763"/>
+            <a:ext cx="9514201" cy="3684932"/>
           </a:xfrm>
           <a:prstGeom prst="rect">
             <a:avLst/>
@@ -10658,10 +10658,10 @@
       </p:graphicFrame>
       <p:pic>
         <p:nvPicPr>
-          <p:cNvPr id="6" name="Imagen 5" descr="Interfaz de usuario gráfica, Aplicación&#10;&#10;Descripción generada automáticamente">
+          <p:cNvPr id="4" name="Imagen 3" descr="Interfaz de usuario gráfica, Aplicación&#10;&#10;Descripción generada automáticamente">
             <a:extLst>
               <a:ext uri="{FF2B5EF4-FFF2-40B4-BE49-F238E27FC236}">
-                <a16:creationId xmlns:a16="http://schemas.microsoft.com/office/drawing/2014/main" id="{3139AB45-6828-0250-5A7E-716EC60B6300}"/>
+                <a16:creationId xmlns:a16="http://schemas.microsoft.com/office/drawing/2014/main" id="{35CE7301-FDC3-7CD6-AA7A-93E78ED23457}"/>
               </a:ext>
             </a:extLst>
           </p:cNvPr>
@@ -10678,8 +10678,8 @@
         </p:blipFill>
         <p:spPr>
           <a:xfrm>
-            <a:off x="708836" y="1882158"/>
-            <a:ext cx="9439275" cy="3981450"/>
+            <a:off x="1065321" y="1541789"/>
+            <a:ext cx="8566952" cy="4805746"/>
           </a:xfrm>
           <a:prstGeom prst="rect">
             <a:avLst/>

</xml_diff>